<commit_message>
Updates ! Back on work
</commit_message>
<xml_diff>
--- a/00 - Presentation.pptx
+++ b/00 - Presentation.pptx
@@ -2969,7 +2969,7 @@
           <a:p>
             <a:fld id="{E9D4BE7C-3CD3-4465-A389-06323A1F0889}" type="datetimeFigureOut">
               <a:rPr lang="fr-FR" smtClean="0"/>
-              <a:t>28/05/2018</a:t>
+              <a:t>07/07/2018</a:t>
             </a:fld>
             <a:endParaRPr lang="fr-FR"/>
           </a:p>
@@ -3487,7 +3487,7 @@
           <a:p>
             <a:fld id="{E9D4BE7C-3CD3-4465-A389-06323A1F0889}" type="datetimeFigureOut">
               <a:rPr lang="fr-FR" smtClean="0"/>
-              <a:t>28/05/2018</a:t>
+              <a:t>07/07/2018</a:t>
             </a:fld>
             <a:endParaRPr lang="fr-FR"/>
           </a:p>
@@ -3667,7 +3667,7 @@
           <a:p>
             <a:fld id="{E9D4BE7C-3CD3-4465-A389-06323A1F0889}" type="datetimeFigureOut">
               <a:rPr lang="fr-FR" smtClean="0"/>
-              <a:t>28/05/2018</a:t>
+              <a:t>07/07/2018</a:t>
             </a:fld>
             <a:endParaRPr lang="fr-FR"/>
           </a:p>
@@ -3954,7 +3954,7 @@
           <a:p>
             <a:fld id="{E9D4BE7C-3CD3-4465-A389-06323A1F0889}" type="datetimeFigureOut">
               <a:rPr lang="fr-FR" smtClean="0"/>
-              <a:t>28/05/2018</a:t>
+              <a:t>07/07/2018</a:t>
             </a:fld>
             <a:endParaRPr lang="fr-FR"/>
           </a:p>
@@ -4166,7 +4166,7 @@
           <a:p>
             <a:fld id="{E9D4BE7C-3CD3-4465-A389-06323A1F0889}" type="datetimeFigureOut">
               <a:rPr lang="fr-FR" smtClean="0"/>
-              <a:t>28/05/2018</a:t>
+              <a:t>07/07/2018</a:t>
             </a:fld>
             <a:endParaRPr lang="fr-FR"/>
           </a:p>
@@ -4509,7 +4509,7 @@
           <a:p>
             <a:fld id="{E9D4BE7C-3CD3-4465-A389-06323A1F0889}" type="datetimeFigureOut">
               <a:rPr lang="fr-FR" smtClean="0"/>
-              <a:t>28/05/2018</a:t>
+              <a:t>07/07/2018</a:t>
             </a:fld>
             <a:endParaRPr lang="fr-FR"/>
           </a:p>
@@ -4784,7 +4784,7 @@
           <a:p>
             <a:fld id="{E9D4BE7C-3CD3-4465-A389-06323A1F0889}" type="datetimeFigureOut">
               <a:rPr lang="fr-FR" smtClean="0"/>
-              <a:t>28/05/2018</a:t>
+              <a:t>07/07/2018</a:t>
             </a:fld>
             <a:endParaRPr lang="fr-FR"/>
           </a:p>
@@ -5163,7 +5163,7 @@
           <a:p>
             <a:fld id="{E9D4BE7C-3CD3-4465-A389-06323A1F0889}" type="datetimeFigureOut">
               <a:rPr lang="fr-FR" smtClean="0"/>
-              <a:t>28/05/2018</a:t>
+              <a:t>07/07/2018</a:t>
             </a:fld>
             <a:endParaRPr lang="fr-FR"/>
           </a:p>
@@ -5281,7 +5281,7 @@
           <a:p>
             <a:fld id="{E9D4BE7C-3CD3-4465-A389-06323A1F0889}" type="datetimeFigureOut">
               <a:rPr lang="fr-FR" smtClean="0"/>
-              <a:t>28/05/2018</a:t>
+              <a:t>07/07/2018</a:t>
             </a:fld>
             <a:endParaRPr lang="fr-FR"/>
           </a:p>
@@ -5452,7 +5452,7 @@
           <a:p>
             <a:fld id="{E9D4BE7C-3CD3-4465-A389-06323A1F0889}" type="datetimeFigureOut">
               <a:rPr lang="fr-FR" smtClean="0"/>
-              <a:t>28/05/2018</a:t>
+              <a:t>07/07/2018</a:t>
             </a:fld>
             <a:endParaRPr lang="fr-FR"/>
           </a:p>
@@ -5806,7 +5806,7 @@
           <a:p>
             <a:fld id="{E9D4BE7C-3CD3-4465-A389-06323A1F0889}" type="datetimeFigureOut">
               <a:rPr lang="fr-FR" smtClean="0"/>
-              <a:t>28/05/2018</a:t>
+              <a:t>07/07/2018</a:t>
             </a:fld>
             <a:endParaRPr lang="fr-FR"/>
           </a:p>
@@ -5997,7 +5997,7 @@
           <a:p>
             <a:fld id="{E9D4BE7C-3CD3-4465-A389-06323A1F0889}" type="datetimeFigureOut">
               <a:rPr lang="fr-FR" smtClean="0"/>
-              <a:t>28/05/2018</a:t>
+              <a:t>07/07/2018</a:t>
             </a:fld>
             <a:endParaRPr lang="fr-FR"/>
           </a:p>
@@ -6358,7 +6358,7 @@
           <a:p>
             <a:fld id="{E9D4BE7C-3CD3-4465-A389-06323A1F0889}" type="datetimeFigureOut">
               <a:rPr lang="fr-FR" smtClean="0"/>
-              <a:t>28/05/2018</a:t>
+              <a:t>07/07/2018</a:t>
             </a:fld>
             <a:endParaRPr lang="fr-FR"/>
           </a:p>
@@ -6528,7 +6528,7 @@
           <a:p>
             <a:fld id="{E9D4BE7C-3CD3-4465-A389-06323A1F0889}" type="datetimeFigureOut">
               <a:rPr lang="fr-FR" smtClean="0"/>
-              <a:t>28/05/2018</a:t>
+              <a:t>07/07/2018</a:t>
             </a:fld>
             <a:endParaRPr lang="fr-FR"/>
           </a:p>
@@ -6784,7 +6784,7 @@
           <a:p>
             <a:fld id="{E9D4BE7C-3CD3-4465-A389-06323A1F0889}" type="datetimeFigureOut">
               <a:rPr lang="fr-FR" smtClean="0"/>
-              <a:t>28/05/2018</a:t>
+              <a:t>07/07/2018</a:t>
             </a:fld>
             <a:endParaRPr lang="fr-FR"/>
           </a:p>
@@ -9913,7 +9913,7 @@
           <a:p>
             <a:fld id="{E9D4BE7C-3CD3-4465-A389-06323A1F0889}" type="datetimeFigureOut">
               <a:rPr lang="fr-FR" smtClean="0"/>
-              <a:t>28/05/2018</a:t>
+              <a:t>07/07/2018</a:t>
             </a:fld>
             <a:endParaRPr lang="fr-FR"/>
           </a:p>
@@ -10201,7 +10201,7 @@
           <a:p>
             <a:fld id="{E9D4BE7C-3CD3-4465-A389-06323A1F0889}" type="datetimeFigureOut">
               <a:rPr lang="fr-FR" smtClean="0"/>
-              <a:t>28/05/2018</a:t>
+              <a:t>07/07/2018</a:t>
             </a:fld>
             <a:endParaRPr lang="fr-FR"/>
           </a:p>
@@ -10623,7 +10623,7 @@
           <a:p>
             <a:fld id="{E9D4BE7C-3CD3-4465-A389-06323A1F0889}" type="datetimeFigureOut">
               <a:rPr lang="fr-FR" smtClean="0"/>
-              <a:t>28/05/2018</a:t>
+              <a:t>07/07/2018</a:t>
             </a:fld>
             <a:endParaRPr lang="fr-FR"/>
           </a:p>
@@ -10741,7 +10741,7 @@
           <a:p>
             <a:fld id="{E9D4BE7C-3CD3-4465-A389-06323A1F0889}" type="datetimeFigureOut">
               <a:rPr lang="fr-FR" smtClean="0"/>
-              <a:t>28/05/2018</a:t>
+              <a:t>07/07/2018</a:t>
             </a:fld>
             <a:endParaRPr lang="fr-FR"/>
           </a:p>
@@ -10836,7 +10836,7 @@
           <a:p>
             <a:fld id="{E9D4BE7C-3CD3-4465-A389-06323A1F0889}" type="datetimeFigureOut">
               <a:rPr lang="fr-FR" smtClean="0"/>
-              <a:t>28/05/2018</a:t>
+              <a:t>07/07/2018</a:t>
             </a:fld>
             <a:endParaRPr lang="fr-FR"/>
           </a:p>
@@ -11016,7 +11016,7 @@
           <a:p>
             <a:fld id="{E9D4BE7C-3CD3-4465-A389-06323A1F0889}" type="datetimeFigureOut">
               <a:rPr lang="fr-FR" smtClean="0"/>
-              <a:t>28/05/2018</a:t>
+              <a:t>07/07/2018</a:t>
             </a:fld>
             <a:endParaRPr lang="fr-FR"/>
           </a:p>
@@ -11507,7 +11507,7 @@
           <a:p>
             <a:fld id="{E9D4BE7C-3CD3-4465-A389-06323A1F0889}" type="datetimeFigureOut">
               <a:rPr lang="fr-FR" smtClean="0"/>
-              <a:t>28/05/2018</a:t>
+              <a:t>07/07/2018</a:t>
             </a:fld>
             <a:endParaRPr lang="fr-FR"/>
           </a:p>
@@ -12064,7 +12064,7 @@
           <a:p>
             <a:fld id="{E9D4BE7C-3CD3-4465-A389-06323A1F0889}" type="datetimeFigureOut">
               <a:rPr lang="fr-FR" smtClean="0"/>
-              <a:t>28/05/2018</a:t>
+              <a:t>07/07/2018</a:t>
             </a:fld>
             <a:endParaRPr lang="fr-FR"/>
           </a:p>
@@ -12691,7 +12691,7 @@
           <a:p>
             <a:fld id="{E9D4BE7C-3CD3-4465-A389-06323A1F0889}" type="datetimeFigureOut">
               <a:rPr lang="fr-FR" smtClean="0"/>
-              <a:t>28/05/2018</a:t>
+              <a:t>07/07/2018</a:t>
             </a:fld>
             <a:endParaRPr lang="fr-FR"/>
           </a:p>
@@ -13232,7 +13232,15 @@
           <a:p>
             <a:r>
               <a:rPr lang="fr-FR" dirty="0" err="1" smtClean="0"/>
-              <a:t>DeadSpells</a:t>
+              <a:t>Realm</a:t>
+            </a:r>
+            <a:r>
+              <a:rPr lang="fr-FR" dirty="0" smtClean="0"/>
+              <a:t> of the </a:t>
+            </a:r>
+            <a:r>
+              <a:rPr lang="fr-FR" smtClean="0"/>
+              <a:t>Deads</a:t>
             </a:r>
             <a:endParaRPr lang="fr-FR" dirty="0"/>
           </a:p>
@@ -16732,11 +16740,7 @@
           <a:p>
             <a:r>
               <a:rPr lang="fr-FR" dirty="0" smtClean="0"/>
-              <a:t>Chaque joueur possède un handicap ne début</a:t>
-            </a:r>
-            <a:r>
-              <a:rPr lang="fr-FR" dirty="0" smtClean="0"/>
-              <a:t> de partie, il perd une faculté a cause de sa mort. </a:t>
+              <a:t>Chaque joueur possède un handicap ne début de partie, il perd une faculté a cause de sa mort. </a:t>
             </a:r>
             <a:endParaRPr lang="fr-FR" dirty="0"/>
           </a:p>
@@ -16751,7 +16755,6 @@
               <a:rPr lang="fr-FR" dirty="0" smtClean="0"/>
               <a:t>Ce handicap sera défini de manière aléatoire par un d6.</a:t>
             </a:r>
-            <a:endParaRPr lang="fr-FR" dirty="0" smtClean="0"/>
           </a:p>
         </p:txBody>
       </p:sp>
@@ -18401,11 +18404,7 @@
             </a:r>
             <a:r>
               <a:rPr lang="fr-FR" dirty="0" smtClean="0"/>
-              <a:t> sont d’anciens parchemins, qui contiennent des écrits</a:t>
-            </a:r>
-            <a:r>
-              <a:rPr lang="fr-FR" dirty="0" smtClean="0"/>
-              <a:t> magiques.</a:t>
+              <a:t> sont d’anciens parchemins, qui contiennent des écrits magiques.</a:t>
             </a:r>
             <a:br>
               <a:rPr lang="fr-FR" dirty="0" smtClean="0"/>

</xml_diff>